<commit_message>
update for some error
</commit_message>
<xml_diff>
--- a/app protocol analysis.pptx
+++ b/app protocol analysis.pptx
@@ -301,7 +301,7 @@
     </p:spTree>
     <p:extLst>
       <p:ext uri="{BB962C8B-B14F-4D97-AF65-F5344CB8AC3E}">
-        <p14:creationId xmlns:p14="http://schemas.microsoft.com/office/powerpoint/2010/main" xmlns="" val="752217958"/>
+        <p14:creationId xmlns="" xmlns:p14="http://schemas.microsoft.com/office/powerpoint/2010/main" val="752217958"/>
       </p:ext>
     </p:extLst>
   </p:cSld>
@@ -563,7 +563,7 @@
     </p:spTree>
     <p:extLst>
       <p:ext uri="{BB962C8B-B14F-4D97-AF65-F5344CB8AC3E}">
-        <p14:creationId xmlns:p14="http://schemas.microsoft.com/office/powerpoint/2010/main" xmlns="" val="817660201"/>
+        <p14:creationId xmlns="" xmlns:p14="http://schemas.microsoft.com/office/powerpoint/2010/main" val="817660201"/>
       </p:ext>
     </p:extLst>
   </p:cSld>
@@ -4376,11 +4376,7 @@
             <a:pPr algn="ctr"/>
             <a:r>
               <a:rPr lang="zh-CN" altLang="en-US" sz="1600" dirty="0" smtClean="0"/>
-              <a:t>王加</a:t>
-            </a:r>
-            <a:r>
-              <a:rPr lang="zh-CN" altLang="en-US" sz="1600" dirty="0" smtClean="0"/>
-              <a:t>水  </a:t>
+              <a:t>王加水  </a:t>
             </a:r>
             <a:endParaRPr lang="en-US" altLang="zh-CN" sz="1600" dirty="0" smtClean="0"/>
           </a:p>
@@ -4388,11 +4384,7 @@
             <a:pPr algn="ctr"/>
             <a:r>
               <a:rPr lang="en-US" altLang="zh-CN" sz="1600" dirty="0" smtClean="0"/>
-              <a:t> </a:t>
-            </a:r>
-            <a:r>
-              <a:rPr lang="en-US" altLang="zh-CN" sz="1600" dirty="0" smtClean="0"/>
-              <a:t> CTD </a:t>
+              <a:t>  CTD </a:t>
             </a:r>
             <a:r>
               <a:rPr lang="zh-CN" altLang="en-US" sz="1600" dirty="0" smtClean="0"/>
@@ -6599,15 +6591,31 @@
             </a:r>
             <a:r>
               <a:rPr lang="zh-CN" altLang="en-US" sz="1100" dirty="0" smtClean="0"/>
-              <a:t>是固定字符，</a:t>
+              <a:t>是</a:t>
+            </a:r>
+            <a:r>
+              <a:rPr lang="en-US" altLang="zh-CN" sz="1100" dirty="0" err="1" smtClean="0"/>
+              <a:t>ssl</a:t>
+            </a:r>
+            <a:r>
+              <a:rPr lang="zh-CN" altLang="en-US" sz="1100" dirty="0" smtClean="0"/>
+              <a:t>固定</a:t>
+            </a:r>
+            <a:r>
+              <a:rPr lang="zh-CN" altLang="en-US" sz="1100" dirty="0" smtClean="0"/>
+              <a:t>字符</a:t>
+            </a:r>
+            <a:r>
+              <a:rPr lang="zh-CN" altLang="en-US" sz="1100" dirty="0" smtClean="0"/>
+              <a:t>，</a:t>
             </a:r>
             <a:r>
               <a:rPr lang="en-US" altLang="zh-CN" sz="1100" dirty="0" smtClean="0"/>
-              <a:t>01</a:t>
-            </a:r>
-            <a:r>
-              <a:rPr lang="zh-CN" altLang="en-US" sz="1100" dirty="0" smtClean="0"/>
-              <a:t>像是控制字，后面是经过处理的数据</a:t>
+              <a:t>70</a:t>
+            </a:r>
+            <a:r>
+              <a:rPr lang="zh-CN" altLang="en-US" sz="1100" smtClean="0"/>
+              <a:t>是后面经过加密后的数据的长度</a:t>
             </a:r>
             <a:endParaRPr lang="en-US" altLang="zh-CN" sz="1100" dirty="0" smtClean="0"/>
           </a:p>
@@ -12544,22 +12552,14 @@
             </a:r>
             <a:r>
               <a:rPr lang="zh-CN" altLang="en-US" sz="1600" dirty="0" smtClean="0"/>
-              <a:t>流媒体，比如快播、风行、百度影音</a:t>
-            </a:r>
-            <a:r>
-              <a:rPr lang="zh-CN" altLang="en-US" sz="1600" dirty="0" smtClean="0"/>
-              <a:t>等</a:t>
+              <a:t>流媒体，比如快播、风行、百度影音等</a:t>
             </a:r>
             <a:endParaRPr lang="en-US" altLang="zh-CN" sz="1600" dirty="0" smtClean="0"/>
           </a:p>
           <a:p>
             <a:r>
               <a:rPr lang="en-US" altLang="zh-CN" sz="1600" dirty="0" smtClean="0"/>
-              <a:t> </a:t>
-            </a:r>
-            <a:r>
-              <a:rPr lang="en-US" altLang="zh-CN" sz="1600" dirty="0" smtClean="0"/>
-              <a:t>   7.</a:t>
+              <a:t>    7.</a:t>
             </a:r>
             <a:r>
               <a:rPr lang="zh-CN" altLang="en-US" sz="1600" dirty="0" smtClean="0"/>
@@ -14618,6 +14618,21 @@
 </file>
 
 <file path=customXml/item1.xml><?xml version="1.0" encoding="utf-8"?>
+<p:properties xmlns:p="http://schemas.microsoft.com/office/2006/metadata/properties" xmlns:xsi="http://www.w3.org/2001/XMLSchema-instance">
+  <documentManagement/>
+</p:properties>
+</file>
+
+<file path=customXml/item2.xml><?xml version="1.0" encoding="utf-8"?>
+<?mso-contentType ?>
+<FormTemplates xmlns="http://schemas.microsoft.com/sharepoint/v3/contenttype/forms">
+  <Display>DocumentLibraryForm</Display>
+  <Edit>DocumentLibraryForm</Edit>
+  <New>DocumentLibraryForm</New>
+</FormTemplates>
+</file>
+
+<file path=customXml/item3.xml><?xml version="1.0" encoding="utf-8"?>
 <ct:contentTypeSchema xmlns:ct="http://schemas.microsoft.com/office/2006/metadata/contentType" xmlns:ma="http://schemas.microsoft.com/office/2006/metadata/properties/metaAttributes" ct:_="" ma:_="" ma:contentTypeName="文档" ma:contentTypeID="0x010100B73800262A4FA145BD0CA523E8D719A9" ma:contentTypeVersion="1" ma:contentTypeDescription="新建文档。" ma:contentTypeScope="" ma:versionID="3565e779b7037ce77d98dd57353f192f">
   <xsd:schema xmlns:xsd="http://www.w3.org/2001/XMLSchema" xmlns:p="http://schemas.microsoft.com/office/2006/metadata/properties" targetNamespace="http://schemas.microsoft.com/office/2006/metadata/properties" ma:root="true" ma:fieldsID="b51e50da1bca0add1c6bbfbefcbaaafa">
     <xsd:element name="properties">
@@ -14666,32 +14681,10 @@
 </ct:contentTypeSchema>
 </file>
 
-<file path=customXml/item2.xml><?xml version="1.0" encoding="utf-8"?>
-<?mso-contentType ?>
-<FormTemplates xmlns="http://schemas.microsoft.com/sharepoint/v3/contenttype/forms">
-  <Display>DocumentLibraryForm</Display>
-  <Edit>DocumentLibraryForm</Edit>
-  <New>DocumentLibraryForm</New>
-</FormTemplates>
-</file>
-
-<file path=customXml/item3.xml><?xml version="1.0" encoding="utf-8"?>
-<p:properties xmlns:p="http://schemas.microsoft.com/office/2006/metadata/properties" xmlns:xsi="http://www.w3.org/2001/XMLSchema-instance">
-  <documentManagement/>
-</p:properties>
-</file>
-
 <file path=customXml/itemProps1.xml><?xml version="1.0" encoding="utf-8"?>
-<ds:datastoreItem xmlns:ds="http://schemas.openxmlformats.org/officeDocument/2006/customXml" ds:itemID="{6C69F3D2-9DAF-4AC2-A8EB-48CE3D4A6ECB}">
+<ds:datastoreItem xmlns:ds="http://schemas.openxmlformats.org/officeDocument/2006/customXml" ds:itemID="{FCD5B357-AA76-4155-B536-A6E4D963C16C}">
   <ds:schemaRefs>
-    <ds:schemaRef ds:uri="http://schemas.microsoft.com/office/2006/metadata/contentType"/>
-    <ds:schemaRef ds:uri="http://schemas.microsoft.com/office/2006/metadata/properties/metaAttributes"/>
-    <ds:schemaRef ds:uri="http://www.w3.org/2001/XMLSchema"/>
     <ds:schemaRef ds:uri="http://schemas.microsoft.com/office/2006/metadata/properties"/>
-    <ds:schemaRef ds:uri="http://schemas.openxmlformats.org/package/2006/metadata/core-properties"/>
-    <ds:schemaRef ds:uri="http://purl.org/dc/elements/1.1/"/>
-    <ds:schemaRef ds:uri="http://purl.org/dc/terms/"/>
-    <ds:schemaRef ds:uri="http://schemas.microsoft.com/office/internal/2005/internalDocumentation"/>
   </ds:schemaRefs>
 </ds:datastoreItem>
 </file>
@@ -14705,9 +14698,16 @@
 </file>
 
 <file path=customXml/itemProps3.xml><?xml version="1.0" encoding="utf-8"?>
-<ds:datastoreItem xmlns:ds="http://schemas.openxmlformats.org/officeDocument/2006/customXml" ds:itemID="{FCD5B357-AA76-4155-B536-A6E4D963C16C}">
+<ds:datastoreItem xmlns:ds="http://schemas.openxmlformats.org/officeDocument/2006/customXml" ds:itemID="{6C69F3D2-9DAF-4AC2-A8EB-48CE3D4A6ECB}">
   <ds:schemaRefs>
+    <ds:schemaRef ds:uri="http://schemas.microsoft.com/office/2006/metadata/contentType"/>
+    <ds:schemaRef ds:uri="http://schemas.microsoft.com/office/2006/metadata/properties/metaAttributes"/>
+    <ds:schemaRef ds:uri="http://www.w3.org/2001/XMLSchema"/>
     <ds:schemaRef ds:uri="http://schemas.microsoft.com/office/2006/metadata/properties"/>
+    <ds:schemaRef ds:uri="http://schemas.openxmlformats.org/package/2006/metadata/core-properties"/>
+    <ds:schemaRef ds:uri="http://purl.org/dc/elements/1.1/"/>
+    <ds:schemaRef ds:uri="http://purl.org/dc/terms/"/>
+    <ds:schemaRef ds:uri="http://schemas.microsoft.com/office/internal/2005/internalDocumentation"/>
   </ds:schemaRefs>
 </ds:datastoreItem>
 </file>
</xml_diff>